<commit_message>
added agregate information in presentation
</commit_message>
<xml_diff>
--- a/DomainDrivenDesignInCScharp.pptx
+++ b/DomainDrivenDesignInCScharp.pptx
@@ -5,10 +5,10 @@
     <p:sldMasterId id="2147483648" r:id="rId1"/>
   </p:sldMasterIdLst>
   <p:notesMasterIdLst>
-    <p:notesMasterId r:id="rId38"/>
+    <p:notesMasterId r:id="rId39"/>
   </p:notesMasterIdLst>
   <p:handoutMasterIdLst>
-    <p:handoutMasterId r:id="rId39"/>
+    <p:handoutMasterId r:id="rId40"/>
   </p:handoutMasterIdLst>
   <p:sldIdLst>
     <p:sldId id="265" r:id="rId2"/>
@@ -40,18 +40,19 @@
     <p:sldId id="363" r:id="rId28"/>
     <p:sldId id="326" r:id="rId29"/>
     <p:sldId id="370" r:id="rId30"/>
-    <p:sldId id="327" r:id="rId31"/>
-    <p:sldId id="329" r:id="rId32"/>
-    <p:sldId id="330" r:id="rId33"/>
-    <p:sldId id="331" r:id="rId34"/>
-    <p:sldId id="334" r:id="rId35"/>
-    <p:sldId id="371" r:id="rId36"/>
-    <p:sldId id="332" r:id="rId37"/>
+    <p:sldId id="373" r:id="rId31"/>
+    <p:sldId id="327" r:id="rId32"/>
+    <p:sldId id="329" r:id="rId33"/>
+    <p:sldId id="330" r:id="rId34"/>
+    <p:sldId id="331" r:id="rId35"/>
+    <p:sldId id="334" r:id="rId36"/>
+    <p:sldId id="371" r:id="rId37"/>
+    <p:sldId id="332" r:id="rId38"/>
   </p:sldIdLst>
   <p:sldSz cx="12188825" cy="6858000"/>
   <p:notesSz cx="6858000" cy="9144000"/>
   <p:custDataLst>
-    <p:tags r:id="rId40"/>
+    <p:tags r:id="rId41"/>
   </p:custDataLst>
   <p:defaultTextStyle>
     <a:defPPr>
@@ -150,7 +151,7 @@
   </p:defaultTextStyle>
   <p:extLst>
     <p:ext uri="{EFAFB233-063F-42B5-8137-9DF3F51BA10A}">
-      <p15:sldGuideLst xmlns="" xmlns:p15="http://schemas.microsoft.com/office/powerpoint/2012/main">
+      <p15:sldGuideLst xmlns:p15="http://schemas.microsoft.com/office/powerpoint/2012/main" xmlns="">
         <p15:guide id="1" pos="3839" userDrawn="1">
           <p15:clr>
             <a:srgbClr val="A4A3A4"/>
@@ -164,7 +165,7 @@
       </p15:sldGuideLst>
     </p:ext>
     <p:ext uri="{2D200454-40CA-4A62-9FC3-DE9A4176ACB9}">
-      <p15:notesGuideLst xmlns="" xmlns:p15="http://schemas.microsoft.com/office/powerpoint/2012/main"/>
+      <p15:notesGuideLst xmlns:p15="http://schemas.microsoft.com/office/powerpoint/2012/main" xmlns=""/>
     </p:ext>
   </p:extLst>
 </p:presentation>
@@ -252,7 +253,7 @@
           <a:p>
             <a:fld id="{59088EAF-6ECA-4616-85EF-35AA19C641F3}" type="datetimeFigureOut">
               <a:rPr lang="en-US"/>
-              <a:t>4/27/2019</a:t>
+              <a:t>5/1/2019</a:t>
             </a:fld>
             <a:endParaRPr/>
           </a:p>
@@ -417,7 +418,7 @@
           <a:p>
             <a:fld id="{3ABD2D7A-D230-4F91-BD59-0A39C2703BA8}" type="datetimeFigureOut">
               <a:rPr lang="en-US"/>
-              <a:t>4/27/2019</a:t>
+              <a:t>5/1/2019</a:t>
             </a:fld>
             <a:endParaRPr/>
           </a:p>
@@ -1031,7 +1032,7 @@
           <a:p>
             <a:fld id="{03F41C87-7AD9-4845-A077-840E4A0F3F06}" type="datetimeFigureOut">
               <a:rPr lang="en-US"/>
-              <a:t>4/27/2019</a:t>
+              <a:t>5/1/2019</a:t>
             </a:fld>
             <a:endParaRPr/>
           </a:p>
@@ -1223,7 +1224,7 @@
           <a:p>
             <a:fld id="{03F41C87-7AD9-4845-A077-840E4A0F3F06}" type="datetimeFigureOut">
               <a:rPr lang="en-US"/>
-              <a:t>4/27/2019</a:t>
+              <a:t>5/1/2019</a:t>
             </a:fld>
             <a:endParaRPr/>
           </a:p>
@@ -1412,7 +1413,7 @@
           <a:p>
             <a:fld id="{03F41C87-7AD9-4845-A077-840E4A0F3F06}" type="datetimeFigureOut">
               <a:rPr lang="en-US"/>
-              <a:t>4/27/2019</a:t>
+              <a:t>5/1/2019</a:t>
             </a:fld>
             <a:endParaRPr/>
           </a:p>
@@ -1692,7 +1693,7 @@
           <a:p>
             <a:fld id="{03F41C87-7AD9-4845-A077-840E4A0F3F06}" type="datetimeFigureOut">
               <a:rPr lang="en-US"/>
-              <a:t>4/27/2019</a:t>
+              <a:t>5/1/2019</a:t>
             </a:fld>
             <a:endParaRPr/>
           </a:p>
@@ -1996,7 +1997,7 @@
           <a:p>
             <a:fld id="{03F41C87-7AD9-4845-A077-840E4A0F3F06}" type="datetimeFigureOut">
               <a:rPr lang="en-US"/>
-              <a:t>4/27/2019</a:t>
+              <a:t>5/1/2019</a:t>
             </a:fld>
             <a:endParaRPr/>
           </a:p>
@@ -2452,7 +2453,7 @@
           <a:p>
             <a:fld id="{03F41C87-7AD9-4845-A077-840E4A0F3F06}" type="datetimeFigureOut">
               <a:rPr lang="en-US"/>
-              <a:t>4/27/2019</a:t>
+              <a:t>5/1/2019</a:t>
             </a:fld>
             <a:endParaRPr/>
           </a:p>
@@ -2582,7 +2583,7 @@
           <a:p>
             <a:fld id="{03F41C87-7AD9-4845-A077-840E4A0F3F06}" type="datetimeFigureOut">
               <a:rPr lang="en-US"/>
-              <a:t>4/27/2019</a:t>
+              <a:t>5/1/2019</a:t>
             </a:fld>
             <a:endParaRPr/>
           </a:p>
@@ -2697,7 +2698,7 @@
           <a:p>
             <a:fld id="{03F41C87-7AD9-4845-A077-840E4A0F3F06}" type="datetimeFigureOut">
               <a:rPr lang="en-US"/>
-              <a:t>4/27/2019</a:t>
+              <a:t>5/1/2019</a:t>
             </a:fld>
             <a:endParaRPr/>
           </a:p>
@@ -3019,7 +3020,7 @@
           <a:p>
             <a:fld id="{03F41C87-7AD9-4845-A077-840E4A0F3F06}" type="datetimeFigureOut">
               <a:rPr lang="en-US"/>
-              <a:t>4/27/2019</a:t>
+              <a:t>5/1/2019</a:t>
             </a:fld>
             <a:endParaRPr/>
           </a:p>
@@ -3331,7 +3332,7 @@
             <a:fld id="{03F41C87-7AD9-4845-A077-840E4A0F3F06}" type="datetimeFigureOut">
               <a:rPr lang="en-US"/>
               <a:pPr/>
-              <a:t>4/27/2019</a:t>
+              <a:t>5/1/2019</a:t>
             </a:fld>
             <a:endParaRPr/>
           </a:p>
@@ -3585,7 +3586,7 @@
             <a:fld id="{03F41C87-7AD9-4845-A077-840E4A0F3F06}" type="datetimeFigureOut">
               <a:rPr lang="en-US" smtClean="0"/>
               <a:pPr/>
-              <a:t>4/27/2019</a:t>
+              <a:t>5/1/2019</a:t>
             </a:fld>
             <a:endParaRPr lang="en-US"/>
           </a:p>
@@ -3968,7 +3969,7 @@
   </p:txStyles>
   <p:extLst mod="1">
     <p:ext uri="{27BBF7A9-308A-43DC-89C8-2F10F3537804}">
-      <p15:sldGuideLst xmlns="" xmlns:p15="http://schemas.microsoft.com/office/powerpoint/2012/main">
+      <p15:sldGuideLst xmlns:p15="http://schemas.microsoft.com/office/powerpoint/2012/main" xmlns="">
         <p15:guide id="1" pos="3839" userDrawn="1">
           <p15:clr>
             <a:srgbClr val="F26B43"/>
@@ -4570,15 +4571,7 @@
             </a:r>
             <a:r>
               <a:rPr lang="en-US" dirty="0" smtClean="0"/>
-              <a:t> </a:t>
-            </a:r>
-            <a:r>
-              <a:rPr lang="en-US" dirty="0" smtClean="0"/>
-              <a:t>I </a:t>
-            </a:r>
-            <a:r>
-              <a:rPr lang="en-US" dirty="0" smtClean="0"/>
-              <a:t>Value Object-i</a:t>
+              <a:t> I Value Object-i</a:t>
             </a:r>
             <a:endParaRPr lang="en-US" dirty="0"/>
           </a:p>
@@ -4631,7 +4624,6 @@
               <a:rPr lang="en-US" dirty="0" smtClean="0"/>
               <a:t> (mutable)</a:t>
             </a:r>
-            <a:endParaRPr lang="en-US" dirty="0" smtClean="0"/>
           </a:p>
           <a:p>
             <a:r>
@@ -4662,7 +4654,6 @@
               <a:rPr lang="en-US" dirty="0" smtClean="0"/>
               <a:t> (immutable)</a:t>
             </a:r>
-            <a:endParaRPr lang="en-US" dirty="0" smtClean="0"/>
           </a:p>
           <a:p>
             <a:r>
@@ -11617,6 +11608,13 @@
       </p:transition>
     </mc:Fallback>
   </mc:AlternateContent>
+  <p:timing>
+    <p:tnLst>
+      <p:par>
+        <p:cTn id="1" dur="indefinite" restart="never" nodeType="tmRoot"/>
+      </p:par>
+    </p:tnLst>
+  </p:timing>
 </p:sld>
 </file>
 
@@ -12491,6 +12489,718 @@
 </file>
 
 <file path=ppt/slides/slide30.xml><?xml version="1.0" encoding="utf-8"?>
+<p:sld xmlns:a="http://schemas.openxmlformats.org/drawingml/2006/main" xmlns:r="http://schemas.openxmlformats.org/officeDocument/2006/relationships" xmlns:p="http://schemas.openxmlformats.org/presentationml/2006/main">
+  <p:cSld>
+    <p:spTree>
+      <p:nvGrpSpPr>
+        <p:cNvPr id="1" name=""/>
+        <p:cNvGrpSpPr/>
+        <p:nvPr/>
+      </p:nvGrpSpPr>
+      <p:grpSpPr>
+        <a:xfrm>
+          <a:off x="0" y="0"/>
+          <a:ext cx="0" cy="0"/>
+          <a:chOff x="0" y="0"/>
+          <a:chExt cx="0" cy="0"/>
+        </a:xfrm>
+      </p:grpSpPr>
+      <p:sp>
+        <p:nvSpPr>
+          <p:cNvPr id="2" name="Title 1"/>
+          <p:cNvSpPr>
+            <a:spLocks noGrp="1"/>
+          </p:cNvSpPr>
+          <p:nvPr>
+            <p:ph type="title"/>
+          </p:nvPr>
+        </p:nvSpPr>
+        <p:spPr/>
+        <p:txBody>
+          <a:bodyPr/>
+          <a:lstStyle/>
+          <a:p>
+            <a:r>
+              <a:rPr lang="en-US" dirty="0" err="1" smtClean="0"/>
+              <a:t>Agregati</a:t>
+            </a:r>
+            <a:endParaRPr lang="en-US" dirty="0"/>
+          </a:p>
+        </p:txBody>
+      </p:sp>
+      <p:sp>
+        <p:nvSpPr>
+          <p:cNvPr id="3" name="Content Placeholder 2"/>
+          <p:cNvSpPr>
+            <a:spLocks noGrp="1"/>
+          </p:cNvSpPr>
+          <p:nvPr>
+            <p:ph idx="1"/>
+          </p:nvPr>
+        </p:nvSpPr>
+        <p:spPr/>
+        <p:txBody>
+          <a:bodyPr/>
+          <a:lstStyle/>
+          <a:p>
+            <a:r>
+              <a:rPr lang="en-US" dirty="0" err="1" smtClean="0"/>
+              <a:t>Agregati</a:t>
+            </a:r>
+            <a:r>
+              <a:rPr lang="en-US" dirty="0" smtClean="0"/>
+              <a:t> </a:t>
+            </a:r>
+            <a:r>
+              <a:rPr lang="en-US" dirty="0" err="1" smtClean="0"/>
+              <a:t>kombinuju</a:t>
+            </a:r>
+            <a:r>
+              <a:rPr lang="en-US" dirty="0" smtClean="0"/>
+              <a:t> </a:t>
+            </a:r>
+            <a:r>
+              <a:rPr lang="en-US" dirty="0" err="1" smtClean="0"/>
+              <a:t>više</a:t>
+            </a:r>
+            <a:r>
+              <a:rPr lang="en-US" dirty="0" smtClean="0"/>
+              <a:t> </a:t>
+            </a:r>
+            <a:r>
+              <a:rPr lang="en-US" dirty="0" err="1" smtClean="0"/>
+              <a:t>entiteta</a:t>
+            </a:r>
+            <a:r>
+              <a:rPr lang="en-US" dirty="0" smtClean="0"/>
+              <a:t> u </a:t>
+            </a:r>
+            <a:r>
+              <a:rPr lang="en-US" dirty="0" err="1" smtClean="0"/>
+              <a:t>jednu</a:t>
+            </a:r>
+            <a:r>
+              <a:rPr lang="en-US" dirty="0" smtClean="0"/>
+              <a:t> </a:t>
+            </a:r>
+            <a:r>
+              <a:rPr lang="en-US" dirty="0" err="1" smtClean="0"/>
+              <a:t>zajedničku</a:t>
+            </a:r>
+            <a:r>
+              <a:rPr lang="en-US" dirty="0" smtClean="0"/>
+              <a:t> </a:t>
+            </a:r>
+            <a:r>
+              <a:rPr lang="en-US" dirty="0" err="1" smtClean="0"/>
+              <a:t>apstrakciju</a:t>
+            </a:r>
+            <a:endParaRPr lang="en-US" dirty="0" smtClean="0"/>
+          </a:p>
+          <a:p>
+            <a:r>
+              <a:rPr lang="en-US" dirty="0" err="1" smtClean="0"/>
+              <a:t>Može</a:t>
+            </a:r>
+            <a:r>
+              <a:rPr lang="en-US" dirty="0" smtClean="0"/>
+              <a:t> se </a:t>
+            </a:r>
+            <a:r>
+              <a:rPr lang="en-US" dirty="0" err="1" smtClean="0"/>
+              <a:t>pristupiti</a:t>
+            </a:r>
+            <a:r>
+              <a:rPr lang="en-US" dirty="0" smtClean="0"/>
+              <a:t> </a:t>
+            </a:r>
+            <a:r>
+              <a:rPr lang="en-US" dirty="0" err="1" smtClean="0"/>
+              <a:t>iz</a:t>
+            </a:r>
+            <a:r>
+              <a:rPr lang="en-US" dirty="0" smtClean="0"/>
+              <a:t> </a:t>
+            </a:r>
+            <a:r>
+              <a:rPr lang="en-US" dirty="0" err="1" smtClean="0"/>
+              <a:t>klijentskog</a:t>
+            </a:r>
+            <a:r>
+              <a:rPr lang="en-US" dirty="0" smtClean="0"/>
+              <a:t> </a:t>
+            </a:r>
+            <a:r>
+              <a:rPr lang="en-US" dirty="0" err="1" smtClean="0"/>
+              <a:t>koda</a:t>
+            </a:r>
+            <a:r>
+              <a:rPr lang="en-US" dirty="0" smtClean="0"/>
+              <a:t> </a:t>
+            </a:r>
+            <a:r>
+              <a:rPr lang="en-US" dirty="0" err="1" smtClean="0"/>
+              <a:t>samo</a:t>
+            </a:r>
+            <a:r>
+              <a:rPr lang="en-US" dirty="0" smtClean="0"/>
+              <a:t> </a:t>
+            </a:r>
+            <a:r>
+              <a:rPr lang="en-US" dirty="0" err="1" smtClean="0"/>
+              <a:t>preko</a:t>
+            </a:r>
+            <a:r>
+              <a:rPr lang="en-US" dirty="0" smtClean="0"/>
+              <a:t> root </a:t>
+            </a:r>
+            <a:r>
+              <a:rPr lang="en-US" dirty="0" err="1" smtClean="0"/>
+              <a:t>entiteta</a:t>
+            </a:r>
+            <a:endParaRPr lang="en-US" dirty="0" smtClean="0"/>
+          </a:p>
+          <a:p>
+            <a:r>
+              <a:rPr lang="en-US" dirty="0" err="1" smtClean="0"/>
+              <a:t>Entitet</a:t>
+            </a:r>
+            <a:r>
+              <a:rPr lang="en-US" dirty="0" smtClean="0"/>
+              <a:t> </a:t>
+            </a:r>
+            <a:r>
+              <a:rPr lang="en-US" dirty="0" err="1" smtClean="0"/>
+              <a:t>može</a:t>
+            </a:r>
+            <a:r>
+              <a:rPr lang="en-US" dirty="0" smtClean="0"/>
+              <a:t> </a:t>
+            </a:r>
+            <a:r>
+              <a:rPr lang="en-US" dirty="0" err="1" smtClean="0"/>
+              <a:t>pripadati</a:t>
+            </a:r>
+            <a:r>
+              <a:rPr lang="en-US" dirty="0" smtClean="0"/>
+              <a:t> SAMO JEDNOM </a:t>
+            </a:r>
+            <a:r>
+              <a:rPr lang="en-US" dirty="0" err="1" smtClean="0"/>
+              <a:t>agregatu</a:t>
+            </a:r>
+            <a:endParaRPr lang="en-US" dirty="0" smtClean="0"/>
+          </a:p>
+          <a:p>
+            <a:r>
+              <a:rPr lang="en-US" dirty="0" smtClean="0"/>
+              <a:t>Value </a:t>
+            </a:r>
+            <a:r>
+              <a:rPr lang="en-US" dirty="0" smtClean="0"/>
+              <a:t>Object </a:t>
+            </a:r>
+            <a:r>
+              <a:rPr lang="en-US" dirty="0" err="1" smtClean="0"/>
+              <a:t>može</a:t>
+            </a:r>
+            <a:r>
+              <a:rPr lang="en-US" dirty="0" smtClean="0"/>
+              <a:t> </a:t>
+            </a:r>
+            <a:r>
+              <a:rPr lang="en-US" dirty="0" err="1" smtClean="0"/>
+              <a:t>pripadati</a:t>
+            </a:r>
+            <a:r>
+              <a:rPr lang="en-US" dirty="0" smtClean="0"/>
+              <a:t> VEĆEM BROJU </a:t>
+            </a:r>
+            <a:r>
+              <a:rPr lang="en-US" dirty="0" err="1" smtClean="0"/>
+              <a:t>agregata</a:t>
+            </a:r>
+            <a:endParaRPr lang="en-US" dirty="0"/>
+          </a:p>
+          <a:p>
+            <a:r>
+              <a:rPr lang="en-US" dirty="0" err="1" smtClean="0"/>
+              <a:t>AggregateRoot</a:t>
+            </a:r>
+            <a:r>
+              <a:rPr lang="en-US" dirty="0" smtClean="0"/>
+              <a:t> </a:t>
+            </a:r>
+            <a:r>
+              <a:rPr lang="en-US" dirty="0" err="1" smtClean="0"/>
+              <a:t>apstraktna</a:t>
+            </a:r>
+            <a:r>
+              <a:rPr lang="en-US" dirty="0" smtClean="0"/>
+              <a:t> </a:t>
+            </a:r>
+            <a:r>
+              <a:rPr lang="en-US" dirty="0" err="1" smtClean="0"/>
+              <a:t>klasa</a:t>
+            </a:r>
+            <a:r>
+              <a:rPr lang="en-US" dirty="0" smtClean="0"/>
+              <a:t> </a:t>
+            </a:r>
+            <a:r>
+              <a:rPr lang="en-US" dirty="0" err="1" smtClean="0"/>
+              <a:t>ekspicitno</a:t>
+            </a:r>
+            <a:r>
+              <a:rPr lang="en-US" dirty="0" smtClean="0"/>
+              <a:t> </a:t>
+            </a:r>
+            <a:r>
+              <a:rPr lang="en-US" dirty="0" err="1" smtClean="0"/>
+              <a:t>pokazuje</a:t>
+            </a:r>
+            <a:r>
+              <a:rPr lang="en-US" dirty="0" smtClean="0"/>
+              <a:t> </a:t>
+            </a:r>
+            <a:r>
+              <a:rPr lang="en-US" dirty="0" err="1" smtClean="0"/>
+              <a:t>granice</a:t>
+            </a:r>
+            <a:r>
+              <a:rPr lang="en-US" dirty="0" smtClean="0"/>
+              <a:t> </a:t>
+            </a:r>
+            <a:r>
+              <a:rPr lang="en-US" dirty="0" err="1" smtClean="0"/>
+              <a:t>agregata</a:t>
+            </a:r>
+            <a:r>
+              <a:rPr lang="en-US" dirty="0" smtClean="0"/>
+              <a:t> u DDD</a:t>
+            </a:r>
+            <a:endParaRPr lang="en-US" dirty="0" smtClean="0"/>
+          </a:p>
+        </p:txBody>
+      </p:sp>
+    </p:spTree>
+    <p:extLst>
+      <p:ext uri="{BB962C8B-B14F-4D97-AF65-F5344CB8AC3E}">
+        <p14:creationId xmlns:p14="http://schemas.microsoft.com/office/powerpoint/2010/main" val="3787168180"/>
+      </p:ext>
+    </p:extLst>
+  </p:cSld>
+  <p:clrMapOvr>
+    <a:masterClrMapping/>
+  </p:clrMapOvr>
+  <mc:AlternateContent xmlns:mc="http://schemas.openxmlformats.org/markup-compatibility/2006" xmlns:p14="http://schemas.microsoft.com/office/powerpoint/2010/main">
+    <mc:Choice Requires="p14">
+      <p:transition spd="med" p14:dur="700">
+        <p:fade/>
+      </p:transition>
+    </mc:Choice>
+    <mc:Fallback xmlns="">
+      <p:transition spd="med">
+        <p:fade/>
+      </p:transition>
+    </mc:Fallback>
+  </mc:AlternateContent>
+  <p:timing>
+    <p:tnLst>
+      <p:par>
+        <p:cTn id="1" dur="indefinite" restart="never" nodeType="tmRoot">
+          <p:childTnLst>
+            <p:seq concurrent="1" nextAc="seek">
+              <p:cTn id="2" dur="indefinite" nodeType="mainSeq">
+                <p:childTnLst>
+                  <p:par>
+                    <p:cTn id="3" fill="hold">
+                      <p:stCondLst>
+                        <p:cond delay="indefinite"/>
+                      </p:stCondLst>
+                      <p:childTnLst>
+                        <p:par>
+                          <p:cTn id="4" fill="hold">
+                            <p:stCondLst>
+                              <p:cond delay="0"/>
+                            </p:stCondLst>
+                            <p:childTnLst>
+                              <p:par>
+                                <p:cTn id="5" presetID="22" presetClass="entr" presetSubtype="4" fill="hold" grpId="0" nodeType="clickEffect">
+                                  <p:stCondLst>
+                                    <p:cond delay="0"/>
+                                  </p:stCondLst>
+                                  <p:childTnLst>
+                                    <p:set>
+                                      <p:cBhvr>
+                                        <p:cTn id="6" dur="1" fill="hold">
+                                          <p:stCondLst>
+                                            <p:cond delay="0"/>
+                                          </p:stCondLst>
+                                        </p:cTn>
+                                        <p:tgtEl>
+                                          <p:spTgt spid="2"/>
+                                        </p:tgtEl>
+                                        <p:attrNameLst>
+                                          <p:attrName>style.visibility</p:attrName>
+                                        </p:attrNameLst>
+                                      </p:cBhvr>
+                                      <p:to>
+                                        <p:strVal val="visible"/>
+                                      </p:to>
+                                    </p:set>
+                                    <p:animEffect transition="in" filter="wipe(down)">
+                                      <p:cBhvr>
+                                        <p:cTn id="7" dur="500"/>
+                                        <p:tgtEl>
+                                          <p:spTgt spid="2"/>
+                                        </p:tgtEl>
+                                      </p:cBhvr>
+                                    </p:animEffect>
+                                  </p:childTnLst>
+                                </p:cTn>
+                              </p:par>
+                            </p:childTnLst>
+                          </p:cTn>
+                        </p:par>
+                      </p:childTnLst>
+                    </p:cTn>
+                  </p:par>
+                  <p:par>
+                    <p:cTn id="8" fill="hold">
+                      <p:stCondLst>
+                        <p:cond delay="indefinite"/>
+                      </p:stCondLst>
+                      <p:childTnLst>
+                        <p:par>
+                          <p:cTn id="9" fill="hold">
+                            <p:stCondLst>
+                              <p:cond delay="0"/>
+                            </p:stCondLst>
+                            <p:childTnLst>
+                              <p:par>
+                                <p:cTn id="10" presetID="22" presetClass="entr" presetSubtype="4" fill="hold" grpId="0" nodeType="clickEffect">
+                                  <p:stCondLst>
+                                    <p:cond delay="0"/>
+                                  </p:stCondLst>
+                                  <p:childTnLst>
+                                    <p:set>
+                                      <p:cBhvr>
+                                        <p:cTn id="11" dur="1" fill="hold">
+                                          <p:stCondLst>
+                                            <p:cond delay="0"/>
+                                          </p:stCondLst>
+                                        </p:cTn>
+                                        <p:tgtEl>
+                                          <p:spTgt spid="3">
+                                            <p:txEl>
+                                              <p:pRg st="0" end="0"/>
+                                            </p:txEl>
+                                          </p:spTgt>
+                                        </p:tgtEl>
+                                        <p:attrNameLst>
+                                          <p:attrName>style.visibility</p:attrName>
+                                        </p:attrNameLst>
+                                      </p:cBhvr>
+                                      <p:to>
+                                        <p:strVal val="visible"/>
+                                      </p:to>
+                                    </p:set>
+                                    <p:animEffect transition="in" filter="wipe(down)">
+                                      <p:cBhvr>
+                                        <p:cTn id="12" dur="500"/>
+                                        <p:tgtEl>
+                                          <p:spTgt spid="3">
+                                            <p:txEl>
+                                              <p:pRg st="0" end="0"/>
+                                            </p:txEl>
+                                          </p:spTgt>
+                                        </p:tgtEl>
+                                      </p:cBhvr>
+                                    </p:animEffect>
+                                  </p:childTnLst>
+                                </p:cTn>
+                              </p:par>
+                            </p:childTnLst>
+                          </p:cTn>
+                        </p:par>
+                      </p:childTnLst>
+                    </p:cTn>
+                  </p:par>
+                  <p:par>
+                    <p:cTn id="13" fill="hold">
+                      <p:stCondLst>
+                        <p:cond delay="indefinite"/>
+                      </p:stCondLst>
+                      <p:childTnLst>
+                        <p:par>
+                          <p:cTn id="14" fill="hold">
+                            <p:stCondLst>
+                              <p:cond delay="0"/>
+                            </p:stCondLst>
+                            <p:childTnLst>
+                              <p:par>
+                                <p:cTn id="15" presetID="22" presetClass="entr" presetSubtype="4" fill="hold" grpId="0" nodeType="clickEffect">
+                                  <p:stCondLst>
+                                    <p:cond delay="0"/>
+                                  </p:stCondLst>
+                                  <p:childTnLst>
+                                    <p:set>
+                                      <p:cBhvr>
+                                        <p:cTn id="16" dur="1" fill="hold">
+                                          <p:stCondLst>
+                                            <p:cond delay="0"/>
+                                          </p:stCondLst>
+                                        </p:cTn>
+                                        <p:tgtEl>
+                                          <p:spTgt spid="3">
+                                            <p:txEl>
+                                              <p:pRg st="1" end="1"/>
+                                            </p:txEl>
+                                          </p:spTgt>
+                                        </p:tgtEl>
+                                        <p:attrNameLst>
+                                          <p:attrName>style.visibility</p:attrName>
+                                        </p:attrNameLst>
+                                      </p:cBhvr>
+                                      <p:to>
+                                        <p:strVal val="visible"/>
+                                      </p:to>
+                                    </p:set>
+                                    <p:animEffect transition="in" filter="wipe(down)">
+                                      <p:cBhvr>
+                                        <p:cTn id="17" dur="500"/>
+                                        <p:tgtEl>
+                                          <p:spTgt spid="3">
+                                            <p:txEl>
+                                              <p:pRg st="1" end="1"/>
+                                            </p:txEl>
+                                          </p:spTgt>
+                                        </p:tgtEl>
+                                      </p:cBhvr>
+                                    </p:animEffect>
+                                  </p:childTnLst>
+                                </p:cTn>
+                              </p:par>
+                            </p:childTnLst>
+                          </p:cTn>
+                        </p:par>
+                      </p:childTnLst>
+                    </p:cTn>
+                  </p:par>
+                  <p:par>
+                    <p:cTn id="18" fill="hold">
+                      <p:stCondLst>
+                        <p:cond delay="indefinite"/>
+                      </p:stCondLst>
+                      <p:childTnLst>
+                        <p:par>
+                          <p:cTn id="19" fill="hold">
+                            <p:stCondLst>
+                              <p:cond delay="0"/>
+                            </p:stCondLst>
+                            <p:childTnLst>
+                              <p:par>
+                                <p:cTn id="20" presetID="22" presetClass="entr" presetSubtype="4" fill="hold" grpId="0" nodeType="clickEffect">
+                                  <p:stCondLst>
+                                    <p:cond delay="0"/>
+                                  </p:stCondLst>
+                                  <p:childTnLst>
+                                    <p:set>
+                                      <p:cBhvr>
+                                        <p:cTn id="21" dur="1" fill="hold">
+                                          <p:stCondLst>
+                                            <p:cond delay="0"/>
+                                          </p:stCondLst>
+                                        </p:cTn>
+                                        <p:tgtEl>
+                                          <p:spTgt spid="3">
+                                            <p:txEl>
+                                              <p:pRg st="2" end="2"/>
+                                            </p:txEl>
+                                          </p:spTgt>
+                                        </p:tgtEl>
+                                        <p:attrNameLst>
+                                          <p:attrName>style.visibility</p:attrName>
+                                        </p:attrNameLst>
+                                      </p:cBhvr>
+                                      <p:to>
+                                        <p:strVal val="visible"/>
+                                      </p:to>
+                                    </p:set>
+                                    <p:animEffect transition="in" filter="wipe(down)">
+                                      <p:cBhvr>
+                                        <p:cTn id="22" dur="500"/>
+                                        <p:tgtEl>
+                                          <p:spTgt spid="3">
+                                            <p:txEl>
+                                              <p:pRg st="2" end="2"/>
+                                            </p:txEl>
+                                          </p:spTgt>
+                                        </p:tgtEl>
+                                      </p:cBhvr>
+                                    </p:animEffect>
+                                  </p:childTnLst>
+                                </p:cTn>
+                              </p:par>
+                            </p:childTnLst>
+                          </p:cTn>
+                        </p:par>
+                      </p:childTnLst>
+                    </p:cTn>
+                  </p:par>
+                  <p:par>
+                    <p:cTn id="23" fill="hold">
+                      <p:stCondLst>
+                        <p:cond delay="indefinite"/>
+                      </p:stCondLst>
+                      <p:childTnLst>
+                        <p:par>
+                          <p:cTn id="24" fill="hold">
+                            <p:stCondLst>
+                              <p:cond delay="0"/>
+                            </p:stCondLst>
+                            <p:childTnLst>
+                              <p:par>
+                                <p:cTn id="25" presetID="22" presetClass="entr" presetSubtype="4" fill="hold" grpId="0" nodeType="clickEffect">
+                                  <p:stCondLst>
+                                    <p:cond delay="0"/>
+                                  </p:stCondLst>
+                                  <p:childTnLst>
+                                    <p:set>
+                                      <p:cBhvr>
+                                        <p:cTn id="26" dur="1" fill="hold">
+                                          <p:stCondLst>
+                                            <p:cond delay="0"/>
+                                          </p:stCondLst>
+                                        </p:cTn>
+                                        <p:tgtEl>
+                                          <p:spTgt spid="3">
+                                            <p:txEl>
+                                              <p:pRg st="3" end="3"/>
+                                            </p:txEl>
+                                          </p:spTgt>
+                                        </p:tgtEl>
+                                        <p:attrNameLst>
+                                          <p:attrName>style.visibility</p:attrName>
+                                        </p:attrNameLst>
+                                      </p:cBhvr>
+                                      <p:to>
+                                        <p:strVal val="visible"/>
+                                      </p:to>
+                                    </p:set>
+                                    <p:animEffect transition="in" filter="wipe(down)">
+                                      <p:cBhvr>
+                                        <p:cTn id="27" dur="500"/>
+                                        <p:tgtEl>
+                                          <p:spTgt spid="3">
+                                            <p:txEl>
+                                              <p:pRg st="3" end="3"/>
+                                            </p:txEl>
+                                          </p:spTgt>
+                                        </p:tgtEl>
+                                      </p:cBhvr>
+                                    </p:animEffect>
+                                  </p:childTnLst>
+                                </p:cTn>
+                              </p:par>
+                            </p:childTnLst>
+                          </p:cTn>
+                        </p:par>
+                      </p:childTnLst>
+                    </p:cTn>
+                  </p:par>
+                  <p:par>
+                    <p:cTn id="28" fill="hold">
+                      <p:stCondLst>
+                        <p:cond delay="indefinite"/>
+                      </p:stCondLst>
+                      <p:childTnLst>
+                        <p:par>
+                          <p:cTn id="29" fill="hold">
+                            <p:stCondLst>
+                              <p:cond delay="0"/>
+                            </p:stCondLst>
+                            <p:childTnLst>
+                              <p:par>
+                                <p:cTn id="30" presetID="22" presetClass="entr" presetSubtype="4" fill="hold" grpId="0" nodeType="clickEffect">
+                                  <p:stCondLst>
+                                    <p:cond delay="0"/>
+                                  </p:stCondLst>
+                                  <p:childTnLst>
+                                    <p:set>
+                                      <p:cBhvr>
+                                        <p:cTn id="31" dur="1" fill="hold">
+                                          <p:stCondLst>
+                                            <p:cond delay="0"/>
+                                          </p:stCondLst>
+                                        </p:cTn>
+                                        <p:tgtEl>
+                                          <p:spTgt spid="3">
+                                            <p:txEl>
+                                              <p:pRg st="4" end="4"/>
+                                            </p:txEl>
+                                          </p:spTgt>
+                                        </p:tgtEl>
+                                        <p:attrNameLst>
+                                          <p:attrName>style.visibility</p:attrName>
+                                        </p:attrNameLst>
+                                      </p:cBhvr>
+                                      <p:to>
+                                        <p:strVal val="visible"/>
+                                      </p:to>
+                                    </p:set>
+                                    <p:animEffect transition="in" filter="wipe(down)">
+                                      <p:cBhvr>
+                                        <p:cTn id="32" dur="500"/>
+                                        <p:tgtEl>
+                                          <p:spTgt spid="3">
+                                            <p:txEl>
+                                              <p:pRg st="4" end="4"/>
+                                            </p:txEl>
+                                          </p:spTgt>
+                                        </p:tgtEl>
+                                      </p:cBhvr>
+                                    </p:animEffect>
+                                  </p:childTnLst>
+                                </p:cTn>
+                              </p:par>
+                            </p:childTnLst>
+                          </p:cTn>
+                        </p:par>
+                      </p:childTnLst>
+                    </p:cTn>
+                  </p:par>
+                </p:childTnLst>
+              </p:cTn>
+              <p:prevCondLst>
+                <p:cond evt="onPrev" delay="0">
+                  <p:tgtEl>
+                    <p:sldTgt/>
+                  </p:tgtEl>
+                </p:cond>
+              </p:prevCondLst>
+              <p:nextCondLst>
+                <p:cond evt="onNext" delay="0">
+                  <p:tgtEl>
+                    <p:sldTgt/>
+                  </p:tgtEl>
+                </p:cond>
+              </p:nextCondLst>
+            </p:seq>
+          </p:childTnLst>
+        </p:cTn>
+      </p:par>
+    </p:tnLst>
+    <p:bldLst>
+      <p:bldP spid="2" grpId="0"/>
+      <p:bldP spid="3" grpId="0" build="p"/>
+    </p:bldLst>
+  </p:timing>
+</p:sld>
+</file>
+
+<file path=ppt/slides/slide31.xml><?xml version="1.0" encoding="utf-8"?>
 <p:sld xmlns:a="http://schemas.openxmlformats.org/drawingml/2006/main" xmlns:r="http://schemas.openxmlformats.org/officeDocument/2006/relationships" xmlns:p="http://schemas.openxmlformats.org/presentationml/2006/main">
   <p:cSld>
     <p:spTree>
@@ -12734,7 +13444,7 @@
 </p:sld>
 </file>
 
-<file path=ppt/slides/slide31.xml><?xml version="1.0" encoding="utf-8"?>
+<file path=ppt/slides/slide32.xml><?xml version="1.0" encoding="utf-8"?>
 <p:sld xmlns:a="http://schemas.openxmlformats.org/drawingml/2006/main" xmlns:r="http://schemas.openxmlformats.org/officeDocument/2006/relationships" xmlns:p="http://schemas.openxmlformats.org/presentationml/2006/main">
   <p:cSld>
     <p:spTree>
@@ -13011,7 +13721,7 @@
 </p:sld>
 </file>
 
-<file path=ppt/slides/slide32.xml><?xml version="1.0" encoding="utf-8"?>
+<file path=ppt/slides/slide33.xml><?xml version="1.0" encoding="utf-8"?>
 <p:sld xmlns:a="http://schemas.openxmlformats.org/drawingml/2006/main" xmlns:r="http://schemas.openxmlformats.org/officeDocument/2006/relationships" xmlns:p="http://schemas.openxmlformats.org/presentationml/2006/main">
   <p:cSld>
     <p:spTree>
@@ -13496,7 +14206,7 @@
 </p:sld>
 </file>
 
-<file path=ppt/slides/slide33.xml><?xml version="1.0" encoding="utf-8"?>
+<file path=ppt/slides/slide34.xml><?xml version="1.0" encoding="utf-8"?>
 <p:sld xmlns:a="http://schemas.openxmlformats.org/drawingml/2006/main" xmlns:r="http://schemas.openxmlformats.org/officeDocument/2006/relationships" xmlns:p="http://schemas.openxmlformats.org/presentationml/2006/main">
   <p:cSld>
     <p:spTree>
@@ -13757,7 +14467,7 @@
 </p:sld>
 </file>
 
-<file path=ppt/slides/slide34.xml><?xml version="1.0" encoding="utf-8"?>
+<file path=ppt/slides/slide35.xml><?xml version="1.0" encoding="utf-8"?>
 <p:sld xmlns:a="http://schemas.openxmlformats.org/drawingml/2006/main" xmlns:r="http://schemas.openxmlformats.org/officeDocument/2006/relationships" xmlns:p="http://schemas.openxmlformats.org/presentationml/2006/main">
   <p:cSld>
     <p:spTree>
@@ -13997,7 +14707,7 @@
 </p:sld>
 </file>
 
-<file path=ppt/slides/slide35.xml><?xml version="1.0" encoding="utf-8"?>
+<file path=ppt/slides/slide36.xml><?xml version="1.0" encoding="utf-8"?>
 <p:sld xmlns:a="http://schemas.openxmlformats.org/drawingml/2006/main" xmlns:r="http://schemas.openxmlformats.org/officeDocument/2006/relationships" xmlns:p="http://schemas.openxmlformats.org/presentationml/2006/main">
   <p:cSld>
     <p:spTree>
@@ -14190,7 +14900,7 @@
 </p:sld>
 </file>
 
-<file path=ppt/slides/slide36.xml><?xml version="1.0" encoding="utf-8"?>
+<file path=ppt/slides/slide37.xml><?xml version="1.0" encoding="utf-8"?>
 <p:sld xmlns:a="http://schemas.openxmlformats.org/drawingml/2006/main" xmlns:r="http://schemas.openxmlformats.org/officeDocument/2006/relationships" xmlns:p="http://schemas.openxmlformats.org/presentationml/2006/main">
   <p:cSld>
     <p:spTree>
@@ -17694,7 +18404,7 @@
   <a:extraClrSchemeLst/>
   <a:extLst>
     <a:ext uri="{05A4C25C-085E-4340-85A3-A5531E510DB2}">
-      <thm15:themeFamily xmlns="" xmlns:thm15="http://schemas.microsoft.com/office/thememl/2012/main" name="TF02895261.potx" id="{4CBF9558-C12D-4F51-9AA3-9D0796951DBC}" vid="{FFC159E6-A134-46E7-B1A0-C306E39FC295}"/>
+      <thm15:themeFamily xmlns:thm15="http://schemas.microsoft.com/office/thememl/2012/main" xmlns="" name="TF02895261.potx" id="{4CBF9558-C12D-4F51-9AA3-9D0796951DBC}" vid="{FFC159E6-A134-46E7-B1A0-C306E39FC295}"/>
     </a:ext>
   </a:extLst>
 </a:theme>

</xml_diff>